<commit_message>
fixed spelling on mbf_card text
</commit_message>
<xml_diff>
--- a/assets/guitar/Template for guitar post cards.pptx
+++ b/assets/guitar/Template for guitar post cards.pptx
@@ -248,7 +248,7 @@
           <a:p>
             <a:fld id="{BB848D93-61F9-441F-8257-F28C49254038}" type="datetimeFigureOut">
               <a:rPr lang="en-US" smtClean="0"/>
-              <a:t>9/21/2022</a:t>
+              <a:t>5/6/2025</a:t>
             </a:fld>
             <a:endParaRPr lang="en-US"/>
           </a:p>
@@ -418,7 +418,7 @@
           <a:p>
             <a:fld id="{BB848D93-61F9-441F-8257-F28C49254038}" type="datetimeFigureOut">
               <a:rPr lang="en-US" smtClean="0"/>
-              <a:t>9/21/2022</a:t>
+              <a:t>5/6/2025</a:t>
             </a:fld>
             <a:endParaRPr lang="en-US"/>
           </a:p>
@@ -598,7 +598,7 @@
           <a:p>
             <a:fld id="{BB848D93-61F9-441F-8257-F28C49254038}" type="datetimeFigureOut">
               <a:rPr lang="en-US" smtClean="0"/>
-              <a:t>9/21/2022</a:t>
+              <a:t>5/6/2025</a:t>
             </a:fld>
             <a:endParaRPr lang="en-US"/>
           </a:p>
@@ -768,7 +768,7 @@
           <a:p>
             <a:fld id="{BB848D93-61F9-441F-8257-F28C49254038}" type="datetimeFigureOut">
               <a:rPr lang="en-US" smtClean="0"/>
-              <a:t>9/21/2022</a:t>
+              <a:t>5/6/2025</a:t>
             </a:fld>
             <a:endParaRPr lang="en-US"/>
           </a:p>
@@ -1012,7 +1012,7 @@
           <a:p>
             <a:fld id="{BB848D93-61F9-441F-8257-F28C49254038}" type="datetimeFigureOut">
               <a:rPr lang="en-US" smtClean="0"/>
-              <a:t>9/21/2022</a:t>
+              <a:t>5/6/2025</a:t>
             </a:fld>
             <a:endParaRPr lang="en-US"/>
           </a:p>
@@ -1244,7 +1244,7 @@
           <a:p>
             <a:fld id="{BB848D93-61F9-441F-8257-F28C49254038}" type="datetimeFigureOut">
               <a:rPr lang="en-US" smtClean="0"/>
-              <a:t>9/21/2022</a:t>
+              <a:t>5/6/2025</a:t>
             </a:fld>
             <a:endParaRPr lang="en-US"/>
           </a:p>
@@ -1611,7 +1611,7 @@
           <a:p>
             <a:fld id="{BB848D93-61F9-441F-8257-F28C49254038}" type="datetimeFigureOut">
               <a:rPr lang="en-US" smtClean="0"/>
-              <a:t>9/21/2022</a:t>
+              <a:t>5/6/2025</a:t>
             </a:fld>
             <a:endParaRPr lang="en-US"/>
           </a:p>
@@ -1729,7 +1729,7 @@
           <a:p>
             <a:fld id="{BB848D93-61F9-441F-8257-F28C49254038}" type="datetimeFigureOut">
               <a:rPr lang="en-US" smtClean="0"/>
-              <a:t>9/21/2022</a:t>
+              <a:t>5/6/2025</a:t>
             </a:fld>
             <a:endParaRPr lang="en-US"/>
           </a:p>
@@ -1824,7 +1824,7 @@
           <a:p>
             <a:fld id="{BB848D93-61F9-441F-8257-F28C49254038}" type="datetimeFigureOut">
               <a:rPr lang="en-US" smtClean="0"/>
-              <a:t>9/21/2022</a:t>
+              <a:t>5/6/2025</a:t>
             </a:fld>
             <a:endParaRPr lang="en-US"/>
           </a:p>
@@ -2101,7 +2101,7 @@
           <a:p>
             <a:fld id="{BB848D93-61F9-441F-8257-F28C49254038}" type="datetimeFigureOut">
               <a:rPr lang="en-US" smtClean="0"/>
-              <a:t>9/21/2022</a:t>
+              <a:t>5/6/2025</a:t>
             </a:fld>
             <a:endParaRPr lang="en-US"/>
           </a:p>
@@ -2358,7 +2358,7 @@
           <a:p>
             <a:fld id="{BB848D93-61F9-441F-8257-F28C49254038}" type="datetimeFigureOut">
               <a:rPr lang="en-US" smtClean="0"/>
-              <a:t>9/21/2022</a:t>
+              <a:t>5/6/2025</a:t>
             </a:fld>
             <a:endParaRPr lang="en-US"/>
           </a:p>
@@ -2571,7 +2571,7 @@
           <a:p>
             <a:fld id="{BB848D93-61F9-441F-8257-F28C49254038}" type="datetimeFigureOut">
               <a:rPr lang="en-US" smtClean="0"/>
-              <a:t>9/21/2022</a:t>
+              <a:t>5/6/2025</a:t>
             </a:fld>
             <a:endParaRPr lang="en-US"/>
           </a:p>
@@ -3531,7 +3531,7 @@
                 <a:latin typeface="Roboto Slab Medium" pitchFamily="2" charset="0"/>
                 <a:ea typeface="Roboto Slab Medium" pitchFamily="2" charset="0"/>
               </a:rPr>
-              <a:t>Modified Bass Fuzz</a:t>
+              <a:t>Modified Bazz Fuss</a:t>
             </a:r>
           </a:p>
         </p:txBody>
@@ -3627,7 +3627,23 @@
                   <a:srgbClr val="847986"/>
                 </a:solidFill>
               </a:rPr>
-              <a:t>My version of the Bass Fuzz circuit </a:t>
+              <a:t>My version of </a:t>
+            </a:r>
+            <a:r>
+              <a:rPr lang="en-US" sz="1600">
+                <a:solidFill>
+                  <a:srgbClr val="847986"/>
+                </a:solidFill>
+              </a:rPr>
+              <a:t>the Bazz Fuss </a:t>
+            </a:r>
+            <a:r>
+              <a:rPr lang="en-US" sz="1600" dirty="0">
+                <a:solidFill>
+                  <a:srgbClr val="847986"/>
+                </a:solidFill>
+              </a:rPr>
+              <a:t>circuit </a:t>
             </a:r>
           </a:p>
           <a:p>

</xml_diff>

<commit_message>
created remaining project cards that were missing
</commit_message>
<xml_diff>
--- a/assets/guitar/Template for guitar post cards.pptx
+++ b/assets/guitar/Template for guitar post cards.pptx
@@ -11,6 +11,8 @@
     <p:sldId id="266" r:id="rId5"/>
     <p:sldId id="265" r:id="rId6"/>
     <p:sldId id="264" r:id="rId7"/>
+    <p:sldId id="268" r:id="rId8"/>
+    <p:sldId id="269" r:id="rId9"/>
   </p:sldIdLst>
   <p:sldSz cx="6400800" cy="5029200"/>
   <p:notesSz cx="6858000" cy="9144000"/>
@@ -3627,23 +3629,7 @@
                   <a:srgbClr val="847986"/>
                 </a:solidFill>
               </a:rPr>
-              <a:t>My version of </a:t>
-            </a:r>
-            <a:r>
-              <a:rPr lang="en-US" sz="1600">
-                <a:solidFill>
-                  <a:srgbClr val="847986"/>
-                </a:solidFill>
-              </a:rPr>
-              <a:t>the Bazz Fuss </a:t>
-            </a:r>
-            <a:r>
-              <a:rPr lang="en-US" sz="1600" dirty="0">
-                <a:solidFill>
-                  <a:srgbClr val="847986"/>
-                </a:solidFill>
-              </a:rPr>
-              <a:t>circuit </a:t>
+              <a:t>My version of the Bazz Fuss circuit </a:t>
             </a:r>
           </a:p>
           <a:p>
@@ -4586,6 +4572,620 @@
     <p:extLst>
       <p:ext uri="{BB962C8B-B14F-4D97-AF65-F5344CB8AC3E}">
         <p14:creationId xmlns:p14="http://schemas.microsoft.com/office/powerpoint/2010/main" val="1690192670"/>
+      </p:ext>
+    </p:extLst>
+  </p:cSld>
+  <p:clrMapOvr>
+    <a:masterClrMapping/>
+  </p:clrMapOvr>
+</p:sld>
+</file>
+
+<file path=ppt/slides/slide7.xml><?xml version="1.0" encoding="utf-8"?>
+<p:sld xmlns:a="http://schemas.openxmlformats.org/drawingml/2006/main" xmlns:r="http://schemas.openxmlformats.org/officeDocument/2006/relationships" xmlns:p="http://schemas.openxmlformats.org/presentationml/2006/main">
+  <p:cSld>
+    <p:bg>
+      <p:bgPr>
+        <a:gradFill>
+          <a:gsLst>
+            <a:gs pos="0">
+              <a:srgbClr val="210F01"/>
+            </a:gs>
+            <a:gs pos="19000">
+              <a:srgbClr val="130600"/>
+            </a:gs>
+            <a:gs pos="47000">
+              <a:srgbClr val="22130C"/>
+            </a:gs>
+            <a:gs pos="68000">
+              <a:srgbClr val="1D0E0B"/>
+            </a:gs>
+          </a:gsLst>
+          <a:lin ang="5400000" scaled="1"/>
+        </a:gradFill>
+        <a:effectLst/>
+      </p:bgPr>
+    </p:bg>
+    <p:spTree>
+      <p:nvGrpSpPr>
+        <p:cNvPr id="1" name="">
+          <a:extLst>
+            <a:ext uri="{FF2B5EF4-FFF2-40B4-BE49-F238E27FC236}">
+              <a16:creationId xmlns:a16="http://schemas.microsoft.com/office/drawing/2014/main" id="{95899F76-4ED7-99D7-0F1E-C791E4BC6BEA}"/>
+            </a:ext>
+          </a:extLst>
+        </p:cNvPr>
+        <p:cNvGrpSpPr/>
+        <p:nvPr/>
+      </p:nvGrpSpPr>
+      <p:grpSpPr>
+        <a:xfrm>
+          <a:off x="0" y="0"/>
+          <a:ext cx="0" cy="0"/>
+          <a:chOff x="0" y="0"/>
+          <a:chExt cx="0" cy="0"/>
+        </a:xfrm>
+      </p:grpSpPr>
+      <p:pic>
+        <p:nvPicPr>
+          <p:cNvPr id="4" name="Picture 3" descr="A red box with two knobs&#10;&#10;AI-generated content may be incorrect.">
+            <a:extLst>
+              <a:ext uri="{FF2B5EF4-FFF2-40B4-BE49-F238E27FC236}">
+                <a16:creationId xmlns:a16="http://schemas.microsoft.com/office/drawing/2014/main" id="{C346DEF7-C98E-41F7-E5E5-02CAA66FA7EF}"/>
+              </a:ext>
+            </a:extLst>
+          </p:cNvPr>
+          <p:cNvPicPr>
+            <a:picLocks noChangeAspect="1"/>
+          </p:cNvPicPr>
+          <p:nvPr/>
+        </p:nvPicPr>
+        <p:blipFill>
+          <a:blip r:embed="rId2">
+            <a:extLst>
+              <a:ext uri="{28A0092B-C50C-407E-A947-70E740481C1C}">
+                <a14:useLocalDpi xmlns:a14="http://schemas.microsoft.com/office/drawing/2010/main" val="0"/>
+              </a:ext>
+            </a:extLst>
+          </a:blip>
+          <a:srcRect t="15990" b="11565"/>
+          <a:stretch/>
+        </p:blipFill>
+        <p:spPr>
+          <a:xfrm>
+            <a:off x="0" y="-1"/>
+            <a:ext cx="6400800" cy="3476953"/>
+          </a:xfrm>
+          <a:prstGeom prst="rect">
+            <a:avLst/>
+          </a:prstGeom>
+        </p:spPr>
+      </p:pic>
+      <p:sp>
+        <p:nvSpPr>
+          <p:cNvPr id="19" name="Rectangle 18">
+            <a:extLst>
+              <a:ext uri="{FF2B5EF4-FFF2-40B4-BE49-F238E27FC236}">
+                <a16:creationId xmlns:a16="http://schemas.microsoft.com/office/drawing/2014/main" id="{79B121EA-60EC-4490-4640-3AB29B4E3B74}"/>
+              </a:ext>
+            </a:extLst>
+          </p:cNvPr>
+          <p:cNvSpPr/>
+          <p:nvPr/>
+        </p:nvSpPr>
+        <p:spPr>
+          <a:xfrm>
+            <a:off x="0" y="3474720"/>
+            <a:ext cx="6400800" cy="1554480"/>
+          </a:xfrm>
+          <a:prstGeom prst="rect">
+            <a:avLst/>
+          </a:prstGeom>
+          <a:solidFill>
+            <a:srgbClr val="F9F9F9"/>
+          </a:solidFill>
+          <a:ln>
+            <a:noFill/>
+          </a:ln>
+        </p:spPr>
+        <p:style>
+          <a:lnRef idx="2">
+            <a:schemeClr val="accent1">
+              <a:shade val="50000"/>
+            </a:schemeClr>
+          </a:lnRef>
+          <a:fillRef idx="1">
+            <a:schemeClr val="accent1"/>
+          </a:fillRef>
+          <a:effectRef idx="0">
+            <a:schemeClr val="accent1"/>
+          </a:effectRef>
+          <a:fontRef idx="minor">
+            <a:schemeClr val="lt1"/>
+          </a:fontRef>
+        </p:style>
+        <p:txBody>
+          <a:bodyPr rtlCol="0" anchor="ctr"/>
+          <a:lstStyle/>
+          <a:p>
+            <a:pPr algn="ctr"/>
+            <a:endParaRPr lang="en-US">
+              <a:solidFill>
+                <a:schemeClr val="bg1"/>
+              </a:solidFill>
+            </a:endParaRPr>
+          </a:p>
+        </p:txBody>
+      </p:sp>
+      <p:sp>
+        <p:nvSpPr>
+          <p:cNvPr id="20" name="TextBox 19">
+            <a:extLst>
+              <a:ext uri="{FF2B5EF4-FFF2-40B4-BE49-F238E27FC236}">
+                <a16:creationId xmlns:a16="http://schemas.microsoft.com/office/drawing/2014/main" id="{D03568B8-2942-FF49-05C8-FC487630788E}"/>
+              </a:ext>
+            </a:extLst>
+          </p:cNvPr>
+          <p:cNvSpPr txBox="1"/>
+          <p:nvPr/>
+        </p:nvSpPr>
+        <p:spPr>
+          <a:xfrm>
+            <a:off x="0" y="3657600"/>
+            <a:ext cx="6400800" cy="400110"/>
+          </a:xfrm>
+          <a:prstGeom prst="rect">
+            <a:avLst/>
+          </a:prstGeom>
+          <a:noFill/>
+        </p:spPr>
+        <p:txBody>
+          <a:bodyPr wrap="square" rtlCol="0">
+            <a:spAutoFit/>
+          </a:bodyPr>
+          <a:lstStyle/>
+          <a:p>
+            <a:pPr algn="ctr"/>
+            <a:r>
+              <a:rPr lang="en-US" sz="2000" dirty="0">
+                <a:latin typeface="Roboto Slab Medium" pitchFamily="2" charset="0"/>
+                <a:ea typeface="Roboto Slab Medium" pitchFamily="2" charset="0"/>
+              </a:rPr>
+              <a:t>Looper Footswitch</a:t>
+            </a:r>
+          </a:p>
+        </p:txBody>
+      </p:sp>
+      <p:sp>
+        <p:nvSpPr>
+          <p:cNvPr id="21" name="Rectangle 20">
+            <a:extLst>
+              <a:ext uri="{FF2B5EF4-FFF2-40B4-BE49-F238E27FC236}">
+                <a16:creationId xmlns:a16="http://schemas.microsoft.com/office/drawing/2014/main" id="{434BB70B-AB16-F003-AA3D-237350F66A4A}"/>
+              </a:ext>
+            </a:extLst>
+          </p:cNvPr>
+          <p:cNvSpPr/>
+          <p:nvPr/>
+        </p:nvSpPr>
+        <p:spPr>
+          <a:xfrm>
+            <a:off x="1805267" y="4014969"/>
+            <a:ext cx="2790265" cy="27432"/>
+          </a:xfrm>
+          <a:prstGeom prst="rect">
+            <a:avLst/>
+          </a:prstGeom>
+          <a:solidFill>
+            <a:srgbClr val="A4D5D9"/>
+          </a:solidFill>
+          <a:ln>
+            <a:noFill/>
+          </a:ln>
+        </p:spPr>
+        <p:style>
+          <a:lnRef idx="2">
+            <a:schemeClr val="accent1">
+              <a:shade val="50000"/>
+            </a:schemeClr>
+          </a:lnRef>
+          <a:fillRef idx="1">
+            <a:schemeClr val="accent1"/>
+          </a:fillRef>
+          <a:effectRef idx="0">
+            <a:schemeClr val="accent1"/>
+          </a:effectRef>
+          <a:fontRef idx="minor">
+            <a:schemeClr val="lt1"/>
+          </a:fontRef>
+        </p:style>
+        <p:txBody>
+          <a:bodyPr rtlCol="0" anchor="ctr"/>
+          <a:lstStyle/>
+          <a:p>
+            <a:pPr algn="ctr"/>
+            <a:endParaRPr lang="en-US"/>
+          </a:p>
+        </p:txBody>
+      </p:sp>
+      <p:sp>
+        <p:nvSpPr>
+          <p:cNvPr id="22" name="TextBox 21">
+            <a:extLst>
+              <a:ext uri="{FF2B5EF4-FFF2-40B4-BE49-F238E27FC236}">
+                <a16:creationId xmlns:a16="http://schemas.microsoft.com/office/drawing/2014/main" id="{813B79DC-84AD-18FE-7030-D209F83D469E}"/>
+              </a:ext>
+            </a:extLst>
+          </p:cNvPr>
+          <p:cNvSpPr txBox="1"/>
+          <p:nvPr/>
+        </p:nvSpPr>
+        <p:spPr>
+          <a:xfrm>
+            <a:off x="0" y="4186778"/>
+            <a:ext cx="6400800" cy="685059"/>
+          </a:xfrm>
+          <a:prstGeom prst="rect">
+            <a:avLst/>
+          </a:prstGeom>
+          <a:noFill/>
+        </p:spPr>
+        <p:txBody>
+          <a:bodyPr wrap="square" rtlCol="0" anchor="ctr" anchorCtr="0">
+            <a:spAutoFit/>
+          </a:bodyPr>
+          <a:lstStyle/>
+          <a:p>
+            <a:pPr algn="ctr">
+              <a:lnSpc>
+                <a:spcPct val="125000"/>
+              </a:lnSpc>
+            </a:pPr>
+            <a:r>
+              <a:rPr lang="en-US" sz="1600" dirty="0">
+                <a:solidFill>
+                  <a:srgbClr val="847986"/>
+                </a:solidFill>
+              </a:rPr>
+              <a:t>Building a footswitch pedal with a very</a:t>
+            </a:r>
+          </a:p>
+          <a:p>
+            <a:pPr algn="ctr">
+              <a:lnSpc>
+                <a:spcPct val="125000"/>
+              </a:lnSpc>
+            </a:pPr>
+            <a:r>
+              <a:rPr lang="en-US" sz="1600" dirty="0">
+                <a:solidFill>
+                  <a:srgbClr val="847986"/>
+                </a:solidFill>
+              </a:rPr>
+              <a:t>small footprint to pair with a looper</a:t>
+            </a:r>
+          </a:p>
+        </p:txBody>
+      </p:sp>
+    </p:spTree>
+    <p:extLst>
+      <p:ext uri="{BB962C8B-B14F-4D97-AF65-F5344CB8AC3E}">
+        <p14:creationId xmlns:p14="http://schemas.microsoft.com/office/powerpoint/2010/main" val="2720023245"/>
+      </p:ext>
+    </p:extLst>
+  </p:cSld>
+  <p:clrMapOvr>
+    <a:masterClrMapping/>
+  </p:clrMapOvr>
+</p:sld>
+</file>
+
+<file path=ppt/slides/slide8.xml><?xml version="1.0" encoding="utf-8"?>
+<p:sld xmlns:a="http://schemas.openxmlformats.org/drawingml/2006/main" xmlns:r="http://schemas.openxmlformats.org/officeDocument/2006/relationships" xmlns:p="http://schemas.openxmlformats.org/presentationml/2006/main">
+  <p:cSld>
+    <p:bg>
+      <p:bgPr>
+        <a:gradFill>
+          <a:gsLst>
+            <a:gs pos="0">
+              <a:srgbClr val="210F01"/>
+            </a:gs>
+            <a:gs pos="19000">
+              <a:srgbClr val="130600"/>
+            </a:gs>
+            <a:gs pos="47000">
+              <a:srgbClr val="22130C"/>
+            </a:gs>
+            <a:gs pos="68000">
+              <a:srgbClr val="1D0E0B"/>
+            </a:gs>
+          </a:gsLst>
+          <a:lin ang="5400000" scaled="1"/>
+        </a:gradFill>
+        <a:effectLst/>
+      </p:bgPr>
+    </p:bg>
+    <p:spTree>
+      <p:nvGrpSpPr>
+        <p:cNvPr id="1" name="">
+          <a:extLst>
+            <a:ext uri="{FF2B5EF4-FFF2-40B4-BE49-F238E27FC236}">
+              <a16:creationId xmlns:a16="http://schemas.microsoft.com/office/drawing/2014/main" id="{681533CF-41D1-A43F-D62A-E7BFDD544207}"/>
+            </a:ext>
+          </a:extLst>
+        </p:cNvPr>
+        <p:cNvGrpSpPr/>
+        <p:nvPr/>
+      </p:nvGrpSpPr>
+      <p:grpSpPr>
+        <a:xfrm>
+          <a:off x="0" y="0"/>
+          <a:ext cx="0" cy="0"/>
+          <a:chOff x="0" y="0"/>
+          <a:chExt cx="0" cy="0"/>
+        </a:xfrm>
+      </p:grpSpPr>
+      <p:sp>
+        <p:nvSpPr>
+          <p:cNvPr id="19" name="Rectangle 18">
+            <a:extLst>
+              <a:ext uri="{FF2B5EF4-FFF2-40B4-BE49-F238E27FC236}">
+                <a16:creationId xmlns:a16="http://schemas.microsoft.com/office/drawing/2014/main" id="{9AF35A72-A8FE-C7E3-C703-403AE14E0677}"/>
+              </a:ext>
+            </a:extLst>
+          </p:cNvPr>
+          <p:cNvSpPr/>
+          <p:nvPr/>
+        </p:nvSpPr>
+        <p:spPr>
+          <a:xfrm>
+            <a:off x="0" y="3474720"/>
+            <a:ext cx="6400800" cy="1554480"/>
+          </a:xfrm>
+          <a:prstGeom prst="rect">
+            <a:avLst/>
+          </a:prstGeom>
+          <a:solidFill>
+            <a:srgbClr val="F9F9F9"/>
+          </a:solidFill>
+          <a:ln>
+            <a:noFill/>
+          </a:ln>
+        </p:spPr>
+        <p:style>
+          <a:lnRef idx="2">
+            <a:schemeClr val="accent1">
+              <a:shade val="50000"/>
+            </a:schemeClr>
+          </a:lnRef>
+          <a:fillRef idx="1">
+            <a:schemeClr val="accent1"/>
+          </a:fillRef>
+          <a:effectRef idx="0">
+            <a:schemeClr val="accent1"/>
+          </a:effectRef>
+          <a:fontRef idx="minor">
+            <a:schemeClr val="lt1"/>
+          </a:fontRef>
+        </p:style>
+        <p:txBody>
+          <a:bodyPr rtlCol="0" anchor="ctr"/>
+          <a:lstStyle/>
+          <a:p>
+            <a:pPr algn="ctr"/>
+            <a:endParaRPr lang="en-US">
+              <a:solidFill>
+                <a:schemeClr val="bg1"/>
+              </a:solidFill>
+            </a:endParaRPr>
+          </a:p>
+        </p:txBody>
+      </p:sp>
+      <p:sp>
+        <p:nvSpPr>
+          <p:cNvPr id="20" name="TextBox 19">
+            <a:extLst>
+              <a:ext uri="{FF2B5EF4-FFF2-40B4-BE49-F238E27FC236}">
+                <a16:creationId xmlns:a16="http://schemas.microsoft.com/office/drawing/2014/main" id="{5C28137A-8669-6D53-AA5D-BB4034C9D302}"/>
+              </a:ext>
+            </a:extLst>
+          </p:cNvPr>
+          <p:cNvSpPr txBox="1"/>
+          <p:nvPr/>
+        </p:nvSpPr>
+        <p:spPr>
+          <a:xfrm>
+            <a:off x="0" y="3657600"/>
+            <a:ext cx="6400800" cy="400110"/>
+          </a:xfrm>
+          <a:prstGeom prst="rect">
+            <a:avLst/>
+          </a:prstGeom>
+          <a:noFill/>
+        </p:spPr>
+        <p:txBody>
+          <a:bodyPr wrap="square" rtlCol="0">
+            <a:spAutoFit/>
+          </a:bodyPr>
+          <a:lstStyle/>
+          <a:p>
+            <a:pPr algn="ctr"/>
+            <a:r>
+              <a:rPr lang="en-US" sz="2000" dirty="0">
+                <a:latin typeface="Roboto Slab Medium" pitchFamily="2" charset="0"/>
+                <a:ea typeface="Roboto Slab Medium" pitchFamily="2" charset="0"/>
+              </a:rPr>
+              <a:t>Modding an EQ700</a:t>
+            </a:r>
+          </a:p>
+        </p:txBody>
+      </p:sp>
+      <p:sp>
+        <p:nvSpPr>
+          <p:cNvPr id="21" name="Rectangle 20">
+            <a:extLst>
+              <a:ext uri="{FF2B5EF4-FFF2-40B4-BE49-F238E27FC236}">
+                <a16:creationId xmlns:a16="http://schemas.microsoft.com/office/drawing/2014/main" id="{7952EEB2-2E87-9BB5-468B-E0B160A5ED30}"/>
+              </a:ext>
+            </a:extLst>
+          </p:cNvPr>
+          <p:cNvSpPr/>
+          <p:nvPr/>
+        </p:nvSpPr>
+        <p:spPr>
+          <a:xfrm>
+            <a:off x="1805267" y="4014969"/>
+            <a:ext cx="2790265" cy="27432"/>
+          </a:xfrm>
+          <a:prstGeom prst="rect">
+            <a:avLst/>
+          </a:prstGeom>
+          <a:solidFill>
+            <a:srgbClr val="A4D5D9"/>
+          </a:solidFill>
+          <a:ln>
+            <a:noFill/>
+          </a:ln>
+        </p:spPr>
+        <p:style>
+          <a:lnRef idx="2">
+            <a:schemeClr val="accent1">
+              <a:shade val="50000"/>
+            </a:schemeClr>
+          </a:lnRef>
+          <a:fillRef idx="1">
+            <a:schemeClr val="accent1"/>
+          </a:fillRef>
+          <a:effectRef idx="0">
+            <a:schemeClr val="accent1"/>
+          </a:effectRef>
+          <a:fontRef idx="minor">
+            <a:schemeClr val="lt1"/>
+          </a:fontRef>
+        </p:style>
+        <p:txBody>
+          <a:bodyPr rtlCol="0" anchor="ctr"/>
+          <a:lstStyle/>
+          <a:p>
+            <a:pPr algn="ctr"/>
+            <a:endParaRPr lang="en-US"/>
+          </a:p>
+        </p:txBody>
+      </p:sp>
+      <p:sp>
+        <p:nvSpPr>
+          <p:cNvPr id="22" name="TextBox 21">
+            <a:extLst>
+              <a:ext uri="{FF2B5EF4-FFF2-40B4-BE49-F238E27FC236}">
+                <a16:creationId xmlns:a16="http://schemas.microsoft.com/office/drawing/2014/main" id="{E396330D-448F-B263-5953-B5DE366D9FDA}"/>
+              </a:ext>
+            </a:extLst>
+          </p:cNvPr>
+          <p:cNvSpPr txBox="1"/>
+          <p:nvPr/>
+        </p:nvSpPr>
+        <p:spPr>
+          <a:xfrm>
+            <a:off x="0" y="4186778"/>
+            <a:ext cx="6400800" cy="685059"/>
+          </a:xfrm>
+          <a:prstGeom prst="rect">
+            <a:avLst/>
+          </a:prstGeom>
+          <a:noFill/>
+        </p:spPr>
+        <p:txBody>
+          <a:bodyPr wrap="square" rtlCol="0" anchor="ctr" anchorCtr="0">
+            <a:spAutoFit/>
+          </a:bodyPr>
+          <a:lstStyle/>
+          <a:p>
+            <a:pPr algn="ctr">
+              <a:lnSpc>
+                <a:spcPct val="125000"/>
+              </a:lnSpc>
+            </a:pPr>
+            <a:r>
+              <a:rPr lang="en-US" sz="1600" dirty="0">
+                <a:solidFill>
+                  <a:srgbClr val="847986"/>
+                </a:solidFill>
+              </a:rPr>
+              <a:t>Fixing </a:t>
+            </a:r>
+            <a:r>
+              <a:rPr lang="en-US" sz="1600">
+                <a:solidFill>
+                  <a:srgbClr val="847986"/>
+                </a:solidFill>
+              </a:rPr>
+              <a:t>a ground </a:t>
+            </a:r>
+            <a:r>
+              <a:rPr lang="en-US" sz="1600" dirty="0">
+                <a:solidFill>
+                  <a:srgbClr val="847986"/>
+                </a:solidFill>
+              </a:rPr>
+              <a:t>issue and further</a:t>
+            </a:r>
+          </a:p>
+          <a:p>
+            <a:pPr algn="ctr">
+              <a:lnSpc>
+                <a:spcPct val="125000"/>
+              </a:lnSpc>
+            </a:pPr>
+            <a:r>
+              <a:rPr lang="en-US" sz="1600" dirty="0">
+                <a:solidFill>
+                  <a:srgbClr val="847986"/>
+                </a:solidFill>
+              </a:rPr>
+              <a:t>modding a Behringer EQ700 Pedal</a:t>
+            </a:r>
+          </a:p>
+        </p:txBody>
+      </p:sp>
+      <p:pic>
+        <p:nvPicPr>
+          <p:cNvPr id="3" name="Picture 2" descr="A green circuit board with many small chips&#10;&#10;AI-generated content may be incorrect.">
+            <a:extLst>
+              <a:ext uri="{FF2B5EF4-FFF2-40B4-BE49-F238E27FC236}">
+                <a16:creationId xmlns:a16="http://schemas.microsoft.com/office/drawing/2014/main" id="{DB38CDE8-626A-23BE-5363-3D50105EAFB7}"/>
+              </a:ext>
+            </a:extLst>
+          </p:cNvPr>
+          <p:cNvPicPr>
+            <a:picLocks noChangeAspect="1"/>
+          </p:cNvPicPr>
+          <p:nvPr/>
+        </p:nvPicPr>
+        <p:blipFill>
+          <a:blip r:embed="rId2">
+            <a:extLst>
+              <a:ext uri="{28A0092B-C50C-407E-A947-70E740481C1C}">
+                <a14:useLocalDpi xmlns:a14="http://schemas.microsoft.com/office/drawing/2010/main" val="0"/>
+              </a:ext>
+            </a:extLst>
+          </a:blip>
+          <a:srcRect l="819" t="17404" r="819" b="23946"/>
+          <a:stretch/>
+        </p:blipFill>
+        <p:spPr>
+          <a:xfrm>
+            <a:off x="-1" y="-1"/>
+            <a:ext cx="6400801" cy="3459411"/>
+          </a:xfrm>
+          <a:prstGeom prst="rect">
+            <a:avLst/>
+          </a:prstGeom>
+        </p:spPr>
+      </p:pic>
+    </p:spTree>
+    <p:extLst>
+      <p:ext uri="{BB962C8B-B14F-4D97-AF65-F5344CB8AC3E}">
+        <p14:creationId xmlns:p14="http://schemas.microsoft.com/office/powerpoint/2010/main" val="900919214"/>
       </p:ext>
     </p:extLst>
   </p:cSld>

</xml_diff>